<commit_message>
powerpoint standaard 16:9 standaard bijbelvertaling te kiezen als constante
</commit_message>
<xml_diff>
--- a/template.pptx
+++ b/template.pptx
@@ -10,7 +10,7 @@
   <p:handoutMasterIdLst>
     <p:handoutMasterId r:id="rId3"/>
   </p:handoutMasterIdLst>
-  <p:sldSz cx="9144000" cy="6858000" type="screen4x3"/>
+  <p:sldSz cx="12192000" cy="6858000"/>
   <p:notesSz cx="6858000" cy="9144000"/>
   <p:defaultTextStyle>
     <a:defPPr>
@@ -140,12 +140,12 @@
   <p:extLst>
     <p:ext uri="{EFAFB233-063F-42B5-8137-9DF3F51BA10A}">
       <p15:sldGuideLst xmlns:p15="http://schemas.microsoft.com/office/powerpoint/2012/main">
-        <p15:guide id="1" orient="horz" pos="2160">
+        <p15:guide id="1" orient="horz" pos="2160" userDrawn="1">
           <p15:clr>
             <a:srgbClr val="A4A3A4"/>
           </p15:clr>
         </p15:guide>
-        <p15:guide id="2" pos="2880">
+        <p15:guide id="2" pos="3840" userDrawn="1">
           <p15:clr>
             <a:srgbClr val="A4A3A4"/>
           </p15:clr>
@@ -250,7 +250,7 @@
               <a:pPr>
                 <a:defRPr/>
               </a:pPr>
-              <a:t>18/11/2021</a:t>
+              <a:t>26/12/2021</a:t>
             </a:fld>
             <a:endParaRPr lang="en-GB"/>
           </a:p>
@@ -433,7 +433,7 @@
               <a:pPr>
                 <a:defRPr/>
               </a:pPr>
-              <a:t>18-11-2021</a:t>
+              <a:t>26-12-2021</a:t>
             </a:fld>
             <a:endParaRPr lang="nl-NL"/>
           </a:p>
@@ -451,8 +451,8 @@
         </p:nvSpPr>
         <p:spPr>
           <a:xfrm>
-            <a:off x="1143000" y="685800"/>
-            <a:ext cx="4572000" cy="3429000"/>
+            <a:off x="381000" y="685800"/>
+            <a:ext cx="6096000" cy="3429000"/>
           </a:xfrm>
           <a:prstGeom prst="rect">
             <a:avLst/>
@@ -773,7 +773,7 @@
         <p:spPr>
           <a:xfrm>
             <a:off x="0" y="4760160"/>
-            <a:ext cx="9144000" cy="2097840"/>
+            <a:ext cx="12192000" cy="2097840"/>
           </a:xfrm>
           <a:prstGeom prst="rect">
             <a:avLst/>

</xml_diff>